<commit_message>
updated ppt2 and Expenses
</commit_message>
<xml_diff>
--- a/Presentation/PPT/Presentation 2.pptx
+++ b/Presentation/PPT/Presentation 2.pptx
@@ -33902,7 +33902,7 @@
       </p:pic>
       <p:pic>
         <p:nvPicPr>
-          <p:cNvPr id="8" name="Picture 7"/>
+          <p:cNvPr id="2" name="Picture 1"/>
           <p:cNvPicPr>
             <a:picLocks noChangeAspect="1"/>
           </p:cNvPicPr>
@@ -33917,7 +33917,7 @@
         <p:spPr>
           <a:xfrm>
             <a:off x="914194" y="4404230"/>
-            <a:ext cx="7190714" cy="2189017"/>
+            <a:ext cx="7190714" cy="1981200"/>
           </a:xfrm>
           <a:prstGeom prst="rect">
             <a:avLst/>

</xml_diff>